<commit_message>
Updated test plan & error pages
Modified test plan and design of error pages
</commit_message>
<xml_diff>
--- a/Test plan/Computech Corporation - Test Plan.pptx
+++ b/Test plan/Computech Corporation - Test Plan.pptx
@@ -329,7 +329,7 @@
                 </a:solidFill>
               </a:rPr>
               <a:pPr/>
-              <a:t>3/26/15</a:t>
+              <a:t>3/29/2015</a:t>
             </a:fld>
             <a:endParaRPr lang="en-US" dirty="0">
               <a:solidFill>
@@ -513,7 +513,7 @@
                 </a:solidFill>
               </a:rPr>
               <a:pPr/>
-              <a:t>3/26/15</a:t>
+              <a:t>3/29/2015</a:t>
             </a:fld>
             <a:endParaRPr lang="en-US" dirty="0">
               <a:solidFill>
@@ -707,7 +707,7 @@
                 </a:solidFill>
               </a:rPr>
               <a:pPr/>
-              <a:t>3/26/15</a:t>
+              <a:t>3/29/2015</a:t>
             </a:fld>
             <a:endParaRPr lang="en-US" dirty="0">
               <a:solidFill>
@@ -891,7 +891,7 @@
                 </a:solidFill>
               </a:rPr>
               <a:pPr/>
-              <a:t>3/26/15</a:t>
+              <a:t>3/29/2015</a:t>
             </a:fld>
             <a:endParaRPr lang="en-US" dirty="0">
               <a:solidFill>
@@ -1151,7 +1151,7 @@
                 </a:solidFill>
               </a:rPr>
               <a:pPr/>
-              <a:t>3/26/15</a:t>
+              <a:t>3/29/2015</a:t>
             </a:fld>
             <a:endParaRPr lang="en-US" dirty="0">
               <a:solidFill>
@@ -1453,7 +1453,7 @@
                 </a:solidFill>
               </a:rPr>
               <a:pPr/>
-              <a:t>3/26/15</a:t>
+              <a:t>3/29/2015</a:t>
             </a:fld>
             <a:endParaRPr lang="en-US" dirty="0">
               <a:solidFill>
@@ -1901,7 +1901,7 @@
                 </a:solidFill>
               </a:rPr>
               <a:pPr/>
-              <a:t>3/26/15</a:t>
+              <a:t>3/29/2015</a:t>
             </a:fld>
             <a:endParaRPr lang="en-US" dirty="0">
               <a:solidFill>
@@ -2033,7 +2033,7 @@
                 </a:solidFill>
               </a:rPr>
               <a:pPr/>
-              <a:t>3/26/15</a:t>
+              <a:t>3/29/2015</a:t>
             </a:fld>
             <a:endParaRPr lang="en-US" dirty="0">
               <a:solidFill>
@@ -2142,7 +2142,7 @@
                 </a:solidFill>
               </a:rPr>
               <a:pPr/>
-              <a:t>3/26/15</a:t>
+              <a:t>3/29/2015</a:t>
             </a:fld>
             <a:endParaRPr lang="en-US" dirty="0">
               <a:solidFill>
@@ -2350,7 +2350,7 @@
                 </a:solidFill>
               </a:rPr>
               <a:pPr/>
-              <a:t>3/26/15</a:t>
+              <a:t>3/29/2015</a:t>
             </a:fld>
             <a:endParaRPr lang="en-US" dirty="0">
               <a:solidFill>
@@ -2687,7 +2687,7 @@
                 </a:solidFill>
               </a:rPr>
               <a:pPr/>
-              <a:t>3/26/15</a:t>
+              <a:t>3/29/2015</a:t>
             </a:fld>
             <a:endParaRPr lang="en-US" dirty="0">
               <a:solidFill>
@@ -3098,7 +3098,7 @@
                 </a:solidFill>
               </a:rPr>
               <a:pPr/>
-              <a:t>3/26/15</a:t>
+              <a:t>3/29/2015</a:t>
             </a:fld>
             <a:endParaRPr lang="en-US" dirty="0">
               <a:solidFill>
@@ -3491,20 +3491,12 @@
           <a:p>
             <a:pPr algn="ctr"/>
             <a:r>
-              <a:rPr lang="en-US" sz="3900" b="1" smtClean="0">
-                <a:solidFill>
-                  <a:schemeClr val="tx1"/>
-                </a:solidFill>
-              </a:rPr>
-              <a:t>Test </a:t>
-            </a:r>
-            <a:r>
               <a:rPr lang="en-US" sz="3900" b="1" dirty="0" smtClean="0">
                 <a:solidFill>
                   <a:schemeClr val="tx1"/>
                 </a:solidFill>
               </a:rPr>
-              <a:t>Plan</a:t>
+              <a:t>Test Plan</a:t>
             </a:r>
           </a:p>
           <a:p>
@@ -3561,12 +3553,12 @@
           <a:p>
             <a:pPr algn="ctr"/>
             <a:r>
-              <a:rPr lang="en-US" smtClean="0">
+              <a:rPr lang="en-US" dirty="0" smtClean="0">
                 <a:solidFill>
                   <a:schemeClr val="tx1"/>
                 </a:solidFill>
               </a:rPr>
-              <a:t>3/23/2015</a:t>
+              <a:t>3/29/2015</a:t>
             </a:r>
             <a:endParaRPr lang="en-US" dirty="0">
               <a:solidFill>
@@ -3607,7 +3599,7 @@
           </a:prstGeom>
           <a:noFill/>
           <a:extLst>
-            <a:ext uri="{909E8E84-426E-40dd-AFC4-6F175D3DCCD1}">
+            <a:ext uri="{909E8E84-426E-40DD-AFC4-6F175D3DCCD1}">
               <a14:hiddenFill xmlns:a14="http://schemas.microsoft.com/office/drawing/2010/main">
                 <a:solidFill>
                   <a:srgbClr val="FFFFFF"/>
@@ -3651,14 +3643,14 @@
             <a:noFill/>
           </a:ln>
           <a:extLst>
-            <a:ext uri="{909E8E84-426E-40dd-AFC4-6F175D3DCCD1}">
+            <a:ext uri="{909E8E84-426E-40DD-AFC4-6F175D3DCCD1}">
               <a14:hiddenFill xmlns:a14="http://schemas.microsoft.com/office/drawing/2010/main">
                 <a:solidFill>
                   <a:schemeClr val="accent1"/>
                 </a:solidFill>
               </a14:hiddenFill>
             </a:ext>
-            <a:ext uri="{91240B29-F687-4f45-9708-019B960494DF}">
+            <a:ext uri="{91240B29-F687-4F45-9708-019B960494DF}">
               <a14:hiddenLine xmlns:a14="http://schemas.microsoft.com/office/drawing/2010/main" w="9525">
                 <a:solidFill>
                   <a:schemeClr val="tx1"/>
@@ -3684,7 +3676,7 @@
   <p:timing>
     <p:tnLst>
       <p:par>
-        <p:cTn xmlns:p14="http://schemas.microsoft.com/office/powerpoint/2010/main" id="1" dur="indefinite" restart="never" nodeType="tmRoot"/>
+        <p:cTn id="1" dur="indefinite" restart="never" nodeType="tmRoot"/>
       </p:par>
     </p:tnLst>
   </p:timing>
@@ -3798,14 +3790,14 @@
           <p:nvPr>
             <p:extLst>
               <p:ext uri="{D42A27DB-BD31-4B8C-83A1-F6EECF244321}">
-                <p14:modId xmlns:p14="http://schemas.microsoft.com/office/powerpoint/2010/main" val="2984746096"/>
+                <p14:modId xmlns:p14="http://schemas.microsoft.com/office/powerpoint/2010/main" val="3477142672"/>
               </p:ext>
             </p:extLst>
           </p:nvPr>
         </p:nvGraphicFramePr>
         <p:xfrm>
-          <a:off x="0" y="4267200"/>
-          <a:ext cx="9143995" cy="2103120"/>
+          <a:off x="2667000" y="4191000"/>
+          <a:ext cx="3200400" cy="2057400"/>
         </p:xfrm>
         <a:graphic>
           <a:graphicData uri="http://schemas.openxmlformats.org/drawingml/2006/table">
@@ -3814,33 +3806,33 @@
                 <a:tableStyleId>{7DF18680-E054-41AD-8BC1-D1AEF772440D}</a:tableStyleId>
               </a:tblPr>
               <a:tblGrid>
-                <a:gridCol w="1306285"/>
-                <a:gridCol w="1306285"/>
-                <a:gridCol w="1306285"/>
-                <a:gridCol w="1306285"/>
-                <a:gridCol w="1306285"/>
-                <a:gridCol w="1306285"/>
-                <a:gridCol w="1306285"/>
+                <a:gridCol w="3200400"/>
               </a:tblGrid>
-              <a:tr h="914400">
-                <a:tc>
-                  <a:txBody>
-                    <a:bodyPr/>
-                    <a:lstStyle/>
-                    <a:p>
-                      <a:r>
-                        <a:rPr lang="en-US" b="1" smtClean="0"/>
+              <a:tr h="685800">
+                <a:tc>
+                  <a:txBody>
+                    <a:bodyPr/>
+                    <a:lstStyle/>
+                    <a:p>
+                      <a:r>
+                        <a:rPr lang="en-US" b="1" dirty="0" smtClean="0"/>
                         <a:t>CT_1: </a:t>
                       </a:r>
                       <a:r>
-                        <a:rPr lang="en-US" smtClean="0"/>
-                        <a:t>Search Jobs</a:t>
-                      </a:r>
-                      <a:endParaRPr lang="en-US"/>
+                        <a:rPr lang="en-US" b="1" dirty="0" smtClean="0"/>
+                        <a:t> </a:t>
+                      </a:r>
+                      <a:r>
+                        <a:rPr lang="en-US" dirty="0" smtClean="0"/>
+                        <a:t>Open website</a:t>
+                      </a:r>
+                      <a:endParaRPr lang="en-US" dirty="0"/>
                     </a:p>
                   </a:txBody>
                   <a:tcPr/>
                 </a:tc>
+              </a:tr>
+              <a:tr h="685800">
                 <a:tc>
                   <a:txBody>
                     <a:bodyPr/>
@@ -3864,17 +3856,24 @@
                         <a:defRPr/>
                       </a:pPr>
                       <a:r>
-                        <a:rPr lang="en-US" b="1" smtClean="0"/>
-                        <a:t>CT_2: </a:t>
-                      </a:r>
-                      <a:r>
-                        <a:rPr lang="en-US" smtClean="0"/>
-                        <a:t>Register</a:t>
-                      </a:r>
+                        <a:rPr lang="en-US" b="1" dirty="0" smtClean="0"/>
+                        <a:t>CT_2:</a:t>
+                      </a:r>
+                      <a:r>
+                        <a:rPr lang="en-US" b="1" baseline="0" dirty="0" smtClean="0"/>
+                        <a:t> </a:t>
+                      </a:r>
+                      <a:r>
+                        <a:rPr lang="en-US" b="0" baseline="0" dirty="0" smtClean="0"/>
+                        <a:t>Featured Jobs</a:t>
+                      </a:r>
+                      <a:endParaRPr lang="en-US" dirty="0" smtClean="0"/>
                     </a:p>
                   </a:txBody>
                   <a:tcPr/>
                 </a:tc>
+              </a:tr>
+              <a:tr h="685800">
                 <a:tc>
                   <a:txBody>
                     <a:bodyPr/>
@@ -3898,399 +3897,18 @@
                         <a:defRPr/>
                       </a:pPr>
                       <a:r>
-                        <a:rPr lang="en-US" b="1" smtClean="0"/>
+                        <a:rPr lang="en-US" b="1" dirty="0" smtClean="0"/>
                         <a:t>CT_3:</a:t>
                       </a:r>
                       <a:r>
-                        <a:rPr lang="en-US" smtClean="0"/>
-                        <a:t> Email Verification</a:t>
-                      </a:r>
-                    </a:p>
-                  </a:txBody>
-                  <a:tcPr/>
-                </a:tc>
-                <a:tc>
-                  <a:txBody>
-                    <a:bodyPr/>
-                    <a:lstStyle/>
-                    <a:p>
-                      <a:pPr marL="0" marR="0" indent="0" algn="l" defTabSz="914400" rtl="0" eaLnBrk="1" fontAlgn="auto" latinLnBrk="0" hangingPunct="1">
-                        <a:lnSpc>
-                          <a:spcPct val="100000"/>
-                        </a:lnSpc>
-                        <a:spcBef>
-                          <a:spcPts val="0"/>
-                        </a:spcBef>
-                        <a:spcAft>
-                          <a:spcPts val="0"/>
-                        </a:spcAft>
-                        <a:buClrTx/>
-                        <a:buSzTx/>
-                        <a:buFontTx/>
-                        <a:buNone/>
-                        <a:tabLst/>
-                        <a:defRPr/>
-                      </a:pPr>
-                      <a:r>
-                        <a:rPr lang="en-US" b="1" smtClean="0"/>
-                        <a:t>CT_4:</a:t>
-                      </a:r>
-                      <a:r>
-                        <a:rPr lang="en-US" smtClean="0"/>
-                        <a:t> Login</a:t>
-                      </a:r>
-                    </a:p>
-                  </a:txBody>
-                  <a:tcPr/>
-                </a:tc>
-                <a:tc>
-                  <a:txBody>
-                    <a:bodyPr/>
-                    <a:lstStyle/>
-                    <a:p>
-                      <a:pPr marL="0" marR="0" indent="0" algn="l" defTabSz="914400" rtl="0" eaLnBrk="1" fontAlgn="auto" latinLnBrk="0" hangingPunct="1">
-                        <a:lnSpc>
-                          <a:spcPct val="100000"/>
-                        </a:lnSpc>
-                        <a:spcBef>
-                          <a:spcPts val="0"/>
-                        </a:spcBef>
-                        <a:spcAft>
-                          <a:spcPts val="0"/>
-                        </a:spcAft>
-                        <a:buClrTx/>
-                        <a:buSzTx/>
-                        <a:buFontTx/>
-                        <a:buNone/>
-                        <a:tabLst/>
-                        <a:defRPr/>
-                      </a:pPr>
-                      <a:r>
-                        <a:rPr lang="en-US" b="1" smtClean="0"/>
-                        <a:t>CT_5: </a:t>
-                      </a:r>
-                      <a:r>
-                        <a:rPr lang="en-US" smtClean="0"/>
-                        <a:t>Forgot Password</a:t>
-                      </a:r>
-                    </a:p>
-                  </a:txBody>
-                  <a:tcPr/>
-                </a:tc>
-                <a:tc>
-                  <a:txBody>
-                    <a:bodyPr/>
-                    <a:lstStyle/>
-                    <a:p>
-                      <a:pPr marL="0" marR="0" indent="0" algn="l" defTabSz="914400" rtl="0" eaLnBrk="1" fontAlgn="auto" latinLnBrk="0" hangingPunct="1">
-                        <a:lnSpc>
-                          <a:spcPct val="100000"/>
-                        </a:lnSpc>
-                        <a:spcBef>
-                          <a:spcPts val="0"/>
-                        </a:spcBef>
-                        <a:spcAft>
-                          <a:spcPts val="0"/>
-                        </a:spcAft>
-                        <a:buClrTx/>
-                        <a:buSzTx/>
-                        <a:buFontTx/>
-                        <a:buNone/>
-                        <a:tabLst/>
-                        <a:defRPr/>
-                      </a:pPr>
-                      <a:r>
-                        <a:rPr lang="en-US" b="1" smtClean="0"/>
-                        <a:t>CT_6: </a:t>
-                      </a:r>
-                      <a:r>
-                        <a:rPr lang="en-US" smtClean="0"/>
-                        <a:t>Change Password</a:t>
-                      </a:r>
-                    </a:p>
-                  </a:txBody>
-                  <a:tcPr/>
-                </a:tc>
-                <a:tc>
-                  <a:txBody>
-                    <a:bodyPr/>
-                    <a:lstStyle/>
-                    <a:p>
-                      <a:pPr marL="0" marR="0" indent="0" algn="l" defTabSz="914400" rtl="0" eaLnBrk="1" fontAlgn="auto" latinLnBrk="0" hangingPunct="1">
-                        <a:lnSpc>
-                          <a:spcPct val="100000"/>
-                        </a:lnSpc>
-                        <a:spcBef>
-                          <a:spcPts val="0"/>
-                        </a:spcBef>
-                        <a:spcAft>
-                          <a:spcPts val="0"/>
-                        </a:spcAft>
-                        <a:buClrTx/>
-                        <a:buSzTx/>
-                        <a:buFontTx/>
-                        <a:buNone/>
-                        <a:tabLst/>
-                        <a:defRPr/>
-                      </a:pPr>
-                      <a:r>
-                        <a:rPr lang="en-US" b="1" smtClean="0"/>
-                        <a:t>CT_7:</a:t>
-                      </a:r>
-                      <a:r>
-                        <a:rPr lang="en-US" smtClean="0"/>
-                        <a:t> Filter Jobs</a:t>
-                      </a:r>
-                    </a:p>
-                  </a:txBody>
-                  <a:tcPr/>
-                </a:tc>
-              </a:tr>
-              <a:tr h="685800">
-                <a:tc>
-                  <a:txBody>
-                    <a:bodyPr/>
-                    <a:lstStyle/>
-                    <a:p>
-                      <a:pPr marL="0" marR="0" indent="0" algn="l" defTabSz="914400" rtl="0" eaLnBrk="1" fontAlgn="auto" latinLnBrk="0" hangingPunct="1">
-                        <a:lnSpc>
-                          <a:spcPct val="100000"/>
-                        </a:lnSpc>
-                        <a:spcBef>
-                          <a:spcPts val="0"/>
-                        </a:spcBef>
-                        <a:spcAft>
-                          <a:spcPts val="0"/>
-                        </a:spcAft>
-                        <a:buClrTx/>
-                        <a:buSzTx/>
-                        <a:buFontTx/>
-                        <a:buNone/>
-                        <a:tabLst/>
-                        <a:defRPr/>
-                      </a:pPr>
-                      <a:r>
-                        <a:rPr lang="en-US" b="1" smtClean="0"/>
-                        <a:t>CT_8: </a:t>
-                      </a:r>
-                      <a:r>
-                        <a:rPr lang="en-US" smtClean="0"/>
-                        <a:t>Profile Information</a:t>
-                      </a:r>
-                    </a:p>
-                  </a:txBody>
-                  <a:tcPr/>
-                </a:tc>
-                <a:tc>
-                  <a:txBody>
-                    <a:bodyPr/>
-                    <a:lstStyle/>
-                    <a:p>
-                      <a:pPr marL="0" marR="0" indent="0" algn="l" defTabSz="914400" rtl="0" eaLnBrk="1" fontAlgn="auto" latinLnBrk="0" hangingPunct="1">
-                        <a:lnSpc>
-                          <a:spcPct val="100000"/>
-                        </a:lnSpc>
-                        <a:spcBef>
-                          <a:spcPts val="0"/>
-                        </a:spcBef>
-                        <a:spcAft>
-                          <a:spcPts val="0"/>
-                        </a:spcAft>
-                        <a:buClrTx/>
-                        <a:buSzTx/>
-                        <a:buFontTx/>
-                        <a:buNone/>
-                        <a:tabLst/>
-                        <a:defRPr/>
-                      </a:pPr>
-                      <a:r>
-                        <a:rPr lang="en-US" b="1" smtClean="0"/>
-                        <a:t>CT_9:</a:t>
-                      </a:r>
-                      <a:r>
-                        <a:rPr lang="en-US" smtClean="0"/>
-                        <a:t> Apply</a:t>
-                      </a:r>
-                    </a:p>
-                  </a:txBody>
-                  <a:tcPr/>
-                </a:tc>
-                <a:tc>
-                  <a:txBody>
-                    <a:bodyPr/>
-                    <a:lstStyle/>
-                    <a:p>
-                      <a:pPr marL="0" marR="0" indent="0" algn="l" defTabSz="914400" rtl="0" eaLnBrk="1" fontAlgn="auto" latinLnBrk="0" hangingPunct="1">
-                        <a:lnSpc>
-                          <a:spcPct val="100000"/>
-                        </a:lnSpc>
-                        <a:spcBef>
-                          <a:spcPts val="0"/>
-                        </a:spcBef>
-                        <a:spcAft>
-                          <a:spcPts val="0"/>
-                        </a:spcAft>
-                        <a:buClrTx/>
-                        <a:buSzTx/>
-                        <a:buFontTx/>
-                        <a:buNone/>
-                        <a:tabLst/>
-                        <a:defRPr/>
-                      </a:pPr>
-                      <a:r>
-                        <a:rPr lang="en-US" b="1" smtClean="0"/>
-                        <a:t>CT_10: </a:t>
-                      </a:r>
-                      <a:r>
-                        <a:rPr lang="en-US" smtClean="0"/>
-                        <a:t>Resume Upload</a:t>
-                      </a:r>
-                    </a:p>
-                  </a:txBody>
-                  <a:tcPr/>
-                </a:tc>
-                <a:tc>
-                  <a:txBody>
-                    <a:bodyPr/>
-                    <a:lstStyle/>
-                    <a:p>
-                      <a:pPr marL="0" marR="0" indent="0" algn="l" defTabSz="914400" rtl="0" eaLnBrk="1" fontAlgn="auto" latinLnBrk="0" hangingPunct="1">
-                        <a:lnSpc>
-                          <a:spcPct val="100000"/>
-                        </a:lnSpc>
-                        <a:spcBef>
-                          <a:spcPts val="0"/>
-                        </a:spcBef>
-                        <a:spcAft>
-                          <a:spcPts val="0"/>
-                        </a:spcAft>
-                        <a:buClrTx/>
-                        <a:buSzTx/>
-                        <a:buFontTx/>
-                        <a:buNone/>
-                        <a:tabLst/>
-                        <a:defRPr/>
-                      </a:pPr>
-                      <a:r>
-                        <a:rPr lang="en-US" b="1" smtClean="0"/>
-                        <a:t>CT_11: </a:t>
-                      </a:r>
-                      <a:r>
-                        <a:rPr lang="en-US" smtClean="0"/>
-                        <a:t>Admin Login</a:t>
-                      </a:r>
-                    </a:p>
-                  </a:txBody>
-                  <a:tcPr/>
-                </a:tc>
-                <a:tc>
-                  <a:txBody>
-                    <a:bodyPr/>
-                    <a:lstStyle/>
-                    <a:p>
-                      <a:pPr marL="0" marR="0" indent="0" algn="l" defTabSz="914400" rtl="0" eaLnBrk="1" fontAlgn="auto" latinLnBrk="0" hangingPunct="1">
-                        <a:lnSpc>
-                          <a:spcPct val="100000"/>
-                        </a:lnSpc>
-                        <a:spcBef>
-                          <a:spcPts val="0"/>
-                        </a:spcBef>
-                        <a:spcAft>
-                          <a:spcPts val="0"/>
-                        </a:spcAft>
-                        <a:buClrTx/>
-                        <a:buSzTx/>
-                        <a:buFontTx/>
-                        <a:buNone/>
-                        <a:tabLst/>
-                        <a:defRPr/>
-                      </a:pPr>
-                      <a:r>
-                        <a:rPr lang="en-US" b="1" smtClean="0"/>
-                        <a:t>CT_12: </a:t>
-                      </a:r>
-                      <a:r>
-                        <a:rPr lang="en-US" smtClean="0"/>
-                        <a:t>Admin Search Users</a:t>
-                      </a:r>
-                    </a:p>
-                  </a:txBody>
-                  <a:tcPr/>
-                </a:tc>
-                <a:tc>
-                  <a:txBody>
-                    <a:bodyPr/>
-                    <a:lstStyle/>
-                    <a:p>
-                      <a:pPr marL="0" marR="0" indent="0" algn="l" defTabSz="914400" rtl="0" eaLnBrk="1" fontAlgn="auto" latinLnBrk="0" hangingPunct="1">
-                        <a:lnSpc>
-                          <a:spcPct val="100000"/>
-                        </a:lnSpc>
-                        <a:spcBef>
-                          <a:spcPts val="0"/>
-                        </a:spcBef>
-                        <a:spcAft>
-                          <a:spcPts val="0"/>
-                        </a:spcAft>
-                        <a:buClrTx/>
-                        <a:buSzTx/>
-                        <a:buFontTx/>
-                        <a:buNone/>
-                        <a:tabLst/>
-                        <a:defRPr/>
-                      </a:pPr>
-                      <a:r>
-                        <a:rPr lang="en-US" b="1" smtClean="0"/>
-                        <a:t>CT_13:</a:t>
-                      </a:r>
-                      <a:r>
-                        <a:rPr lang="en-US" b="1" baseline="0" smtClean="0"/>
+                        <a:rPr lang="en-US" b="1" baseline="0" dirty="0" smtClean="0"/>
                         <a:t> </a:t>
                       </a:r>
                       <a:r>
-                        <a:rPr lang="en-US" baseline="0" smtClean="0"/>
-                        <a:t>Admin Deactivate User</a:t>
-                      </a:r>
-                      <a:endParaRPr lang="en-US" smtClean="0"/>
-                    </a:p>
-                  </a:txBody>
-                  <a:tcPr/>
-                </a:tc>
-                <a:tc>
-                  <a:txBody>
-                    <a:bodyPr/>
-                    <a:lstStyle/>
-                    <a:p>
-                      <a:pPr marL="0" marR="0" indent="0" algn="l" defTabSz="914400" rtl="0" eaLnBrk="1" fontAlgn="auto" latinLnBrk="0" hangingPunct="1">
-                        <a:lnSpc>
-                          <a:spcPct val="100000"/>
-                        </a:lnSpc>
-                        <a:spcBef>
-                          <a:spcPts val="0"/>
-                        </a:spcBef>
-                        <a:spcAft>
-                          <a:spcPts val="0"/>
-                        </a:spcAft>
-                        <a:buClrTx/>
-                        <a:buSzTx/>
-                        <a:buFontTx/>
-                        <a:buNone/>
-                        <a:tabLst/>
-                        <a:defRPr/>
-                      </a:pPr>
-                      <a:r>
-                        <a:rPr lang="en-US" b="1" smtClean="0"/>
-                        <a:t>CT_14: </a:t>
-                      </a:r>
-                      <a:r>
-                        <a:rPr lang="en-US" smtClean="0"/>
-                        <a:t>Admin</a:t>
-                      </a:r>
-                      <a:r>
-                        <a:rPr lang="en-US" baseline="0" smtClean="0"/>
-                        <a:t> Delete User</a:t>
-                      </a:r>
-                      <a:endParaRPr lang="en-US" smtClean="0"/>
+                        <a:rPr lang="en-US" b="0" baseline="0" dirty="0" smtClean="0"/>
+                        <a:t>Recommended Jobs</a:t>
+                      </a:r>
+                      <a:endParaRPr lang="en-US" dirty="0" smtClean="0"/>
                     </a:p>
                   </a:txBody>
                   <a:tcPr/>
@@ -4313,7 +3931,7 @@
   <p:timing>
     <p:tnLst>
       <p:par>
-        <p:cTn xmlns:p14="http://schemas.microsoft.com/office/powerpoint/2010/main" id="1" dur="indefinite" restart="never" nodeType="tmRoot"/>
+        <p:cTn id="1" dur="indefinite" restart="never" nodeType="tmRoot"/>
       </p:par>
     </p:tnLst>
   </p:timing>
@@ -4365,7 +3983,7 @@
       </p:sp>
       <p:graphicFrame>
         <p:nvGraphicFramePr>
-          <p:cNvPr id="5" name="Content Placeholder 4"/>
+          <p:cNvPr id="4" name="Content Placeholder 3"/>
           <p:cNvGraphicFramePr>
             <a:graphicFrameLocks noGrp="1"/>
           </p:cNvGraphicFramePr>
@@ -4373,14 +3991,14 @@
             <p:ph idx="1"/>
             <p:extLst>
               <p:ext uri="{D42A27DB-BD31-4B8C-83A1-F6EECF244321}">
-                <p14:modId xmlns:p14="http://schemas.microsoft.com/office/powerpoint/2010/main" val="1195586946"/>
+                <p14:modId xmlns:p14="http://schemas.microsoft.com/office/powerpoint/2010/main" val="4181681004"/>
               </p:ext>
             </p:extLst>
           </p:nvPr>
         </p:nvGraphicFramePr>
         <p:xfrm>
-          <a:off x="381000" y="1371602"/>
-          <a:ext cx="7543800" cy="5181600"/>
+          <a:off x="533400" y="1447801"/>
+          <a:ext cx="6858000" cy="4876799"/>
         </p:xfrm>
         <a:graphic>
           <a:graphicData uri="http://schemas.openxmlformats.org/drawingml/2006/table">
@@ -4389,10 +4007,10 @@
                 <a:tableStyleId>{5C22544A-7EE6-4342-B048-85BDC9FD1C3A}</a:tableStyleId>
               </a:tblPr>
               <a:tblGrid>
-                <a:gridCol w="2099067"/>
-                <a:gridCol w="5444733"/>
+                <a:gridCol w="1928091"/>
+                <a:gridCol w="4929909"/>
               </a:tblGrid>
-              <a:tr h="448888">
+              <a:tr h="476011">
                 <a:tc>
                   <a:txBody>
                     <a:bodyPr/>
@@ -4415,12 +4033,12 @@
                         </a:tabLst>
                       </a:pPr>
                       <a:r>
-                        <a:rPr lang="en-US" sz="1600">
+                        <a:rPr lang="en-US" sz="1200">
                           <a:effectLst/>
                         </a:rPr>
                         <a:t>ID</a:t>
                       </a:r>
-                      <a:endParaRPr lang="en-US" sz="1600">
+                      <a:endParaRPr lang="en-US" sz="1200">
                         <a:effectLst/>
                         <a:latin typeface="Times"/>
                         <a:ea typeface="Times"/>
@@ -4452,12 +4070,12 @@
                         </a:tabLst>
                       </a:pPr>
                       <a:r>
-                        <a:rPr lang="en-US" sz="1600">
+                        <a:rPr lang="en-US" sz="1200">
                           <a:effectLst/>
                         </a:rPr>
                         <a:t>CT_2</a:t>
                       </a:r>
-                      <a:endParaRPr lang="en-US" sz="1600">
+                      <a:endParaRPr lang="en-US" sz="1200">
                         <a:effectLst/>
                         <a:latin typeface="Times"/>
                         <a:ea typeface="Times"/>
@@ -4468,7 +4086,7 @@
                   <a:tcPr marL="63500" marR="63500" marT="63500" marB="63500"/>
                 </a:tc>
               </a:tr>
-              <a:tr h="448888">
+              <a:tr h="476011">
                 <a:tc>
                   <a:txBody>
                     <a:bodyPr/>
@@ -4491,12 +4109,12 @@
                         </a:tabLst>
                       </a:pPr>
                       <a:r>
-                        <a:rPr lang="en-US" sz="1600">
+                        <a:rPr lang="en-US" sz="1200">
                           <a:effectLst/>
                         </a:rPr>
                         <a:t>Item to Test</a:t>
                       </a:r>
-                      <a:endParaRPr lang="en-US" sz="1600">
+                      <a:endParaRPr lang="en-US" sz="1200">
                         <a:effectLst/>
                         <a:latin typeface="Times"/>
                         <a:ea typeface="Times"/>
@@ -4528,12 +4146,12 @@
                         </a:tabLst>
                       </a:pPr>
                       <a:r>
-                        <a:rPr lang="en-US" sz="1600">
-                          <a:effectLst/>
-                        </a:rPr>
-                        <a:t>Register</a:t>
-                      </a:r>
-                      <a:endParaRPr lang="en-US" sz="1600">
+                        <a:rPr lang="en-US" sz="1200">
+                          <a:effectLst/>
+                        </a:rPr>
+                        <a:t>Featured jobs</a:t>
+                      </a:r>
+                      <a:endParaRPr lang="en-US" sz="1200">
                         <a:effectLst/>
                         <a:latin typeface="Times"/>
                         <a:ea typeface="Times"/>
@@ -4544,7 +4162,7 @@
                   <a:tcPr marL="63500" marR="63500" marT="63500" marB="63500"/>
                 </a:tc>
               </a:tr>
-              <a:tr h="448888">
+              <a:tr h="476011">
                 <a:tc>
                   <a:txBody>
                     <a:bodyPr/>
@@ -4567,12 +4185,12 @@
                         </a:tabLst>
                       </a:pPr>
                       <a:r>
-                        <a:rPr lang="en-US" sz="1600">
+                        <a:rPr lang="en-US" sz="1200">
                           <a:effectLst/>
                         </a:rPr>
                         <a:t>Pre-Conditions</a:t>
                       </a:r>
-                      <a:endParaRPr lang="en-US" sz="1600">
+                      <a:endParaRPr lang="en-US" sz="1200">
                         <a:effectLst/>
                         <a:latin typeface="Times"/>
                         <a:ea typeface="Times"/>
@@ -4596,12 +4214,12 @@
                         </a:tabLst>
                       </a:pPr>
                       <a:r>
-                        <a:rPr lang="en-US" sz="1600">
+                        <a:rPr lang="en-US" sz="1100">
                           <a:effectLst/>
                         </a:rPr>
                         <a:t>None</a:t>
                       </a:r>
-                      <a:endParaRPr lang="en-US" sz="1600">
+                      <a:endParaRPr lang="en-US" sz="1100">
                         <a:effectLst/>
                         <a:latin typeface="Calibri"/>
                       </a:endParaRPr>
@@ -4610,7 +4228,7 @@
                   <a:tcPr marL="63500" marR="63500" marT="63500" marB="63500"/>
                 </a:tc>
               </a:tr>
-              <a:tr h="2196932">
+              <a:tr h="1402845">
                 <a:tc>
                   <a:txBody>
                     <a:bodyPr/>
@@ -4633,12 +4251,12 @@
                         </a:tabLst>
                       </a:pPr>
                       <a:r>
-                        <a:rPr lang="en-US" sz="1600">
+                        <a:rPr lang="en-US" sz="1200">
                           <a:effectLst/>
                         </a:rPr>
                         <a:t>Test Steps</a:t>
                       </a:r>
-                      <a:endParaRPr lang="en-US" sz="1600">
+                      <a:endParaRPr lang="en-US" sz="1200">
                         <a:effectLst/>
                         <a:latin typeface="Times"/>
                         <a:ea typeface="Times"/>
@@ -4670,7 +4288,7 @@
                         </a:tabLst>
                       </a:pPr>
                       <a:r>
-                        <a:rPr lang="en-US" sz="1600">
+                        <a:rPr lang="en-US" sz="1200">
                           <a:effectLst/>
                         </a:rPr>
                         <a:t>Repeat the below process for each supported Device and Browser type</a:t>
@@ -4698,96 +4316,12 @@
                         </a:tabLst>
                       </a:pPr>
                       <a:r>
-                        <a:rPr lang="en-US" sz="1600" u="none" strike="noStrike">
-                          <a:effectLst/>
-                        </a:rPr>
-                        <a:t>Click on Users dropdown list on the header.</a:t>
-                      </a:r>
-                    </a:p>
-                    <a:p>
-                      <a:pPr marL="342900" marR="0" lvl="0" indent="-342900">
-                        <a:lnSpc>
-                          <a:spcPct val="115000"/>
-                        </a:lnSpc>
-                        <a:spcBef>
-                          <a:spcPts val="0"/>
-                        </a:spcBef>
-                        <a:spcAft>
-                          <a:spcPts val="0"/>
-                        </a:spcAft>
-                        <a:buFont typeface="+mj-lt"/>
-                        <a:buAutoNum type="arabicPeriod"/>
-                        <a:tabLst>
-                          <a:tab pos="114300" algn="l"/>
-                          <a:tab pos="228600" algn="l"/>
-                          <a:tab pos="457200" algn="l"/>
-                          <a:tab pos="114300" algn="l"/>
-                          <a:tab pos="228600" algn="l"/>
-                        </a:tabLst>
-                      </a:pPr>
-                      <a:r>
-                        <a:rPr lang="en-US" sz="1600" u="none" strike="noStrike">
-                          <a:effectLst/>
-                        </a:rPr>
-                        <a:t>Click on Register link.</a:t>
-                      </a:r>
-                    </a:p>
-                    <a:p>
-                      <a:pPr marL="342900" marR="0" lvl="0" indent="-342900">
-                        <a:lnSpc>
-                          <a:spcPct val="115000"/>
-                        </a:lnSpc>
-                        <a:spcBef>
-                          <a:spcPts val="0"/>
-                        </a:spcBef>
-                        <a:spcAft>
-                          <a:spcPts val="0"/>
-                        </a:spcAft>
-                        <a:buFont typeface="+mj-lt"/>
-                        <a:buAutoNum type="arabicPeriod"/>
-                        <a:tabLst>
-                          <a:tab pos="114300" algn="l"/>
-                          <a:tab pos="228600" algn="l"/>
-                          <a:tab pos="457200" algn="l"/>
-                          <a:tab pos="114300" algn="l"/>
-                          <a:tab pos="228600" algn="l"/>
-                        </a:tabLst>
-                      </a:pPr>
-                      <a:r>
-                        <a:rPr lang="en-US" sz="1600" u="none" strike="noStrike">
-                          <a:effectLst/>
-                        </a:rPr>
-                        <a:t>Fill in First Name, Last Name, Email Address, Password and Confirm Password.</a:t>
-                      </a:r>
-                    </a:p>
-                    <a:p>
-                      <a:pPr marL="342900" marR="0" lvl="0" indent="-342900">
-                        <a:lnSpc>
-                          <a:spcPct val="115000"/>
-                        </a:lnSpc>
-                        <a:spcBef>
-                          <a:spcPts val="0"/>
-                        </a:spcBef>
-                        <a:spcAft>
-                          <a:spcPts val="0"/>
-                        </a:spcAft>
-                        <a:buFont typeface="+mj-lt"/>
-                        <a:buAutoNum type="arabicPeriod"/>
-                        <a:tabLst>
-                          <a:tab pos="114300" algn="l"/>
-                          <a:tab pos="228600" algn="l"/>
-                          <a:tab pos="457200" algn="l"/>
-                          <a:tab pos="114300" algn="l"/>
-                          <a:tab pos="228600" algn="l"/>
-                        </a:tabLst>
-                      </a:pPr>
-                      <a:r>
-                        <a:rPr lang="en-US" sz="1600" u="none" strike="noStrike">
-                          <a:effectLst/>
-                        </a:rPr>
-                        <a:t>Click on Register</a:t>
-                      </a:r>
-                      <a:endParaRPr lang="en-US" sz="1600" u="none" strike="noStrike">
+                        <a:rPr lang="en-US" sz="1200" u="none" strike="noStrike">
+                          <a:effectLst/>
+                        </a:rPr>
+                        <a:t>Enter www.computech.com/careers in the address bar of the browser</a:t>
+                      </a:r>
+                      <a:endParaRPr lang="en-US" sz="1200" u="none" strike="noStrike">
                         <a:effectLst/>
                         <a:latin typeface="Times"/>
                         <a:ea typeface="Times"/>
@@ -4798,7 +4332,7 @@
                   <a:tcPr marL="63500" marR="63500" marT="63500" marB="63500"/>
                 </a:tc>
               </a:tr>
-              <a:tr h="740228">
+              <a:tr h="784955">
                 <a:tc>
                   <a:txBody>
                     <a:bodyPr/>
@@ -4821,12 +4355,12 @@
                         </a:tabLst>
                       </a:pPr>
                       <a:r>
-                        <a:rPr lang="en-US" sz="1600">
+                        <a:rPr lang="en-US" sz="1200">
                           <a:effectLst/>
                         </a:rPr>
                         <a:t>Expected Results</a:t>
                       </a:r>
-                      <a:endParaRPr lang="en-US" sz="1600">
+                      <a:endParaRPr lang="en-US" sz="1200">
                         <a:effectLst/>
                         <a:latin typeface="Times"/>
                         <a:ea typeface="Times"/>
@@ -4858,12 +4392,12 @@
                         </a:tabLst>
                       </a:pPr>
                       <a:r>
-                        <a:rPr lang="en-US" sz="1600">
-                          <a:effectLst/>
-                        </a:rPr>
-                        <a:t>System should send an email to user containing email verification link and display confirmation page to user.</a:t>
-                      </a:r>
-                      <a:endParaRPr lang="en-US" sz="1600">
+                        <a:rPr lang="en-US" sz="1200">
+                          <a:effectLst/>
+                        </a:rPr>
+                        <a:t>Browser should open EJCA web application which displays featured jobs at the lower half of the home page.</a:t>
+                      </a:r>
+                      <a:endParaRPr lang="en-US" sz="1200">
                         <a:effectLst/>
                         <a:latin typeface="Times"/>
                         <a:ea typeface="Times"/>
@@ -4874,7 +4408,7 @@
                   <a:tcPr marL="63500" marR="63500" marT="63500" marB="63500"/>
                 </a:tc>
               </a:tr>
-              <a:tr h="448888">
+              <a:tr h="476011">
                 <a:tc>
                   <a:txBody>
                     <a:bodyPr/>
@@ -4897,12 +4431,12 @@
                         </a:tabLst>
                       </a:pPr>
                       <a:r>
-                        <a:rPr lang="en-US" sz="1600">
+                        <a:rPr lang="en-US" sz="1200">
                           <a:effectLst/>
                         </a:rPr>
                         <a:t>Priority</a:t>
                       </a:r>
-                      <a:endParaRPr lang="en-US" sz="1600">
+                      <a:endParaRPr lang="en-US" sz="1200">
                         <a:effectLst/>
                         <a:latin typeface="Times"/>
                         <a:ea typeface="Times"/>
@@ -4934,12 +4468,12 @@
                         </a:tabLst>
                       </a:pPr>
                       <a:r>
-                        <a:rPr lang="en-US" sz="1600">
+                        <a:rPr lang="en-US" sz="1200">
                           <a:effectLst/>
                         </a:rPr>
                         <a:t>High</a:t>
                       </a:r>
-                      <a:endParaRPr lang="en-US" sz="1600">
+                      <a:endParaRPr lang="en-US" sz="1200">
                         <a:effectLst/>
                         <a:latin typeface="Times"/>
                         <a:ea typeface="Times"/>
@@ -4950,7 +4484,7 @@
                   <a:tcPr marL="63500" marR="63500" marT="63500" marB="63500"/>
                 </a:tc>
               </a:tr>
-              <a:tr h="448888">
+              <a:tr h="784955">
                 <a:tc>
                   <a:txBody>
                     <a:bodyPr/>
@@ -4973,12 +4507,12 @@
                         </a:tabLst>
                       </a:pPr>
                       <a:r>
-                        <a:rPr lang="en-US" sz="1600">
+                        <a:rPr lang="en-US" sz="1200">
                           <a:effectLst/>
                         </a:rPr>
                         <a:t>Pass/Fail</a:t>
                       </a:r>
-                      <a:endParaRPr lang="en-US" sz="1600">
+                      <a:endParaRPr lang="en-US" sz="1200">
                         <a:effectLst/>
                         <a:latin typeface="Times"/>
                         <a:ea typeface="Times"/>
@@ -5010,12 +4544,12 @@
                         </a:tabLst>
                       </a:pPr>
                       <a:r>
-                        <a:rPr lang="en-US" sz="1600" dirty="0">
-                          <a:effectLst/>
-                        </a:rPr>
-                        <a:t> Pass if system redirect user to Register page.</a:t>
-                      </a:r>
-                      <a:endParaRPr lang="en-US" sz="1600" dirty="0">
+                        <a:rPr lang="en-US" sz="1200" dirty="0">
+                          <a:effectLst/>
+                        </a:rPr>
+                        <a:t>Pass if EJCA web application is opened and featured jobs are displayed on home page.</a:t>
+                      </a:r>
+                      <a:endParaRPr lang="en-US" sz="1200" dirty="0">
                         <a:effectLst/>
                         <a:latin typeface="Times"/>
                         <a:ea typeface="Times"/>
@@ -5043,7 +4577,7 @@
   <p:timing>
     <p:tnLst>
       <p:par>
-        <p:cTn xmlns:p14="http://schemas.microsoft.com/office/powerpoint/2010/main" id="1" dur="indefinite" restart="never" nodeType="tmRoot"/>
+        <p:cTn id="1" dur="indefinite" restart="never" nodeType="tmRoot"/>
       </p:par>
     </p:tnLst>
   </p:timing>
@@ -5170,7 +4704,7 @@
   <p:timing>
     <p:tnLst>
       <p:par>
-        <p:cTn xmlns:p14="http://schemas.microsoft.com/office/powerpoint/2010/main" id="1" dur="indefinite" restart="never" nodeType="tmRoot"/>
+        <p:cTn id="1" dur="indefinite" restart="never" nodeType="tmRoot"/>
       </p:par>
     </p:tnLst>
   </p:timing>
@@ -5254,7 +4788,7 @@
   <p:timing>
     <p:tnLst>
       <p:par>
-        <p:cTn xmlns:p14="http://schemas.microsoft.com/office/powerpoint/2010/main" id="1" dur="indefinite" restart="never" nodeType="tmRoot"/>
+        <p:cTn id="1" dur="indefinite" restart="never" nodeType="tmRoot"/>
       </p:par>
     </p:tnLst>
   </p:timing>
@@ -5375,7 +4909,7 @@
   <p:timing>
     <p:tnLst>
       <p:par>
-        <p:cTn xmlns:p14="http://schemas.microsoft.com/office/powerpoint/2010/main" id="1" dur="indefinite" restart="never" nodeType="tmRoot"/>
+        <p:cTn id="1" dur="indefinite" restart="never" nodeType="tmRoot"/>
       </p:par>
     </p:tnLst>
   </p:timing>
@@ -5459,14 +4993,14 @@
           </a:ln>
           <a:effectLst/>
           <a:extLst>
-            <a:ext uri="{909E8E84-426E-40dd-AFC4-6F175D3DCCD1}">
+            <a:ext uri="{909E8E84-426E-40DD-AFC4-6F175D3DCCD1}">
               <a14:hiddenFill xmlns:a14="http://schemas.microsoft.com/office/drawing/2010/main">
                 <a:solidFill>
                   <a:schemeClr val="accent1"/>
                 </a:solidFill>
               </a14:hiddenFill>
             </a:ext>
-            <a:ext uri="{91240B29-F687-4f45-9708-019B960494DF}">
+            <a:ext uri="{91240B29-F687-4F45-9708-019B960494DF}">
               <a14:hiddenLine xmlns:a14="http://schemas.microsoft.com/office/drawing/2010/main" w="9525">
                 <a:solidFill>
                   <a:schemeClr val="tx1"/>
@@ -5476,7 +5010,7 @@
                 <a:tailEnd/>
               </a14:hiddenLine>
             </a:ext>
-            <a:ext uri="{AF507438-7753-43e0-B8FC-AC1667EBCBE1}">
+            <a:ext uri="{AF507438-7753-43E0-B8FC-AC1667EBCBE1}">
               <a14:hiddenEffects xmlns:a14="http://schemas.microsoft.com/office/drawing/2010/main">
                 <a:effectLst>
                   <a:outerShdw dist="35921" dir="2700000" algn="ctr" rotWithShape="0">
@@ -5501,7 +5035,7 @@
   <p:timing>
     <p:tnLst>
       <p:par>
-        <p:cTn xmlns:p14="http://schemas.microsoft.com/office/powerpoint/2010/main" id="1" dur="indefinite" restart="never" nodeType="tmRoot"/>
+        <p:cTn id="1" dur="indefinite" restart="never" nodeType="tmRoot"/>
       </p:par>
     </p:tnLst>
   </p:timing>
@@ -5644,7 +5178,7 @@
   <p:timing>
     <p:tnLst>
       <p:par>
-        <p:cTn xmlns:p14="http://schemas.microsoft.com/office/powerpoint/2010/main" id="1" dur="indefinite" restart="never" nodeType="tmRoot"/>
+        <p:cTn id="1" dur="indefinite" restart="never" nodeType="tmRoot"/>
       </p:par>
     </p:tnLst>
   </p:timing>
@@ -5749,14 +5283,14 @@
           </a:ln>
           <a:effectLst/>
           <a:extLst>
-            <a:ext uri="{909E8E84-426E-40dd-AFC4-6F175D3DCCD1}">
+            <a:ext uri="{909E8E84-426E-40DD-AFC4-6F175D3DCCD1}">
               <a14:hiddenFill xmlns:a14="http://schemas.microsoft.com/office/drawing/2010/main">
                 <a:solidFill>
                   <a:schemeClr val="accent1"/>
                 </a:solidFill>
               </a14:hiddenFill>
             </a:ext>
-            <a:ext uri="{91240B29-F687-4f45-9708-019B960494DF}">
+            <a:ext uri="{91240B29-F687-4F45-9708-019B960494DF}">
               <a14:hiddenLine xmlns:a14="http://schemas.microsoft.com/office/drawing/2010/main" w="9525">
                 <a:solidFill>
                   <a:schemeClr val="tx1"/>
@@ -5766,7 +5300,7 @@
                 <a:tailEnd/>
               </a14:hiddenLine>
             </a:ext>
-            <a:ext uri="{AF507438-7753-43e0-B8FC-AC1667EBCBE1}">
+            <a:ext uri="{AF507438-7753-43E0-B8FC-AC1667EBCBE1}">
               <a14:hiddenEffects xmlns:a14="http://schemas.microsoft.com/office/drawing/2010/main">
                 <a:effectLst>
                   <a:outerShdw dist="35921" dir="2700000" algn="ctr" rotWithShape="0">
@@ -5791,7 +5325,7 @@
   <p:timing>
     <p:tnLst>
       <p:par>
-        <p:cTn xmlns:p14="http://schemas.microsoft.com/office/powerpoint/2010/main" id="1" dur="indefinite" restart="never" nodeType="tmRoot"/>
+        <p:cTn id="1" dur="indefinite" restart="never" nodeType="tmRoot"/>
       </p:par>
     </p:tnLst>
   </p:timing>
@@ -5942,7 +5476,7 @@
   <p:timing>
     <p:tnLst>
       <p:par>
-        <p:cTn xmlns:p14="http://schemas.microsoft.com/office/powerpoint/2010/main" id="1" dur="indefinite" restart="never" nodeType="tmRoot"/>
+        <p:cTn id="1" dur="indefinite" restart="never" nodeType="tmRoot"/>
       </p:par>
     </p:tnLst>
   </p:timing>
@@ -6276,7 +5810,7 @@
   <p:timing>
     <p:tnLst>
       <p:par>
-        <p:cTn xmlns:p14="http://schemas.microsoft.com/office/powerpoint/2010/main" id="1" dur="indefinite" restart="never" nodeType="tmRoot"/>
+        <p:cTn id="1" dur="indefinite" restart="never" nodeType="tmRoot"/>
       </p:par>
     </p:tnLst>
   </p:timing>
@@ -6409,7 +5943,7 @@
   <p:timing>
     <p:tnLst>
       <p:par>
-        <p:cTn xmlns:p14="http://schemas.microsoft.com/office/powerpoint/2010/main" id="1" dur="indefinite" restart="never" nodeType="tmRoot"/>
+        <p:cTn id="1" dur="indefinite" restart="never" nodeType="tmRoot"/>
       </p:par>
     </p:tnLst>
   </p:timing>
@@ -6490,14 +6024,14 @@
           </a:ln>
           <a:effectLst/>
           <a:extLst>
-            <a:ext uri="{909E8E84-426E-40dd-AFC4-6F175D3DCCD1}">
+            <a:ext uri="{909E8E84-426E-40DD-AFC4-6F175D3DCCD1}">
               <a14:hiddenFill xmlns:a14="http://schemas.microsoft.com/office/drawing/2010/main">
                 <a:solidFill>
                   <a:schemeClr val="accent1"/>
                 </a:solidFill>
               </a14:hiddenFill>
             </a:ext>
-            <a:ext uri="{91240B29-F687-4f45-9708-019B960494DF}">
+            <a:ext uri="{91240B29-F687-4F45-9708-019B960494DF}">
               <a14:hiddenLine xmlns:a14="http://schemas.microsoft.com/office/drawing/2010/main" w="9525">
                 <a:solidFill>
                   <a:schemeClr val="tx1"/>
@@ -6507,7 +6041,7 @@
                 <a:tailEnd/>
               </a14:hiddenLine>
             </a:ext>
-            <a:ext uri="{AF507438-7753-43e0-B8FC-AC1667EBCBE1}">
+            <a:ext uri="{AF507438-7753-43E0-B8FC-AC1667EBCBE1}">
               <a14:hiddenEffects xmlns:a14="http://schemas.microsoft.com/office/drawing/2010/main">
                 <a:effectLst>
                   <a:outerShdw dist="35921" dir="2700000" algn="ctr" rotWithShape="0">
@@ -6532,7 +6066,7 @@
   <p:timing>
     <p:tnLst>
       <p:par>
-        <p:cTn xmlns:p14="http://schemas.microsoft.com/office/powerpoint/2010/main" id="1" dur="indefinite" restart="never" nodeType="tmRoot"/>
+        <p:cTn id="1" dur="indefinite" restart="never" nodeType="tmRoot"/>
       </p:par>
     </p:tnLst>
   </p:timing>
@@ -6764,11 +6298,7 @@
                       </a:pPr>
                       <a:r>
                         <a:rPr lang="en-US" b="1" dirty="0" smtClean="0"/>
-                        <a:t>UAT_2</a:t>
-                      </a:r>
-                      <a:r>
-                        <a:rPr lang="en-US" b="1" dirty="0" smtClean="0"/>
-                        <a:t>: </a:t>
+                        <a:t>UAT_2: </a:t>
                       </a:r>
                       <a:r>
                         <a:rPr lang="en-US" dirty="0" smtClean="0"/>
@@ -6802,11 +6332,7 @@
                       </a:pPr>
                       <a:r>
                         <a:rPr lang="en-US" b="1" dirty="0" smtClean="0"/>
-                        <a:t>UAT_3</a:t>
-                      </a:r>
-                      <a:r>
-                        <a:rPr lang="en-US" b="1" dirty="0" smtClean="0"/>
-                        <a:t>: </a:t>
+                        <a:t>UAT_3: </a:t>
                       </a:r>
                       <a:r>
                         <a:rPr lang="en-US" dirty="0" smtClean="0"/>
@@ -6840,11 +6366,7 @@
                       </a:pPr>
                       <a:r>
                         <a:rPr lang="en-US" b="1" dirty="0" smtClean="0"/>
-                        <a:t>UAT_4</a:t>
-                      </a:r>
-                      <a:r>
-                        <a:rPr lang="en-US" b="1" dirty="0" smtClean="0"/>
-                        <a:t>: </a:t>
+                        <a:t>UAT_4: </a:t>
                       </a:r>
                       <a:r>
                         <a:rPr lang="en-US" dirty="0" smtClean="0"/>
@@ -6878,11 +6400,7 @@
                       </a:pPr>
                       <a:r>
                         <a:rPr lang="en-US" b="1" dirty="0" smtClean="0"/>
-                        <a:t>UAT_5</a:t>
-                      </a:r>
-                      <a:r>
-                        <a:rPr lang="en-US" b="1" dirty="0" smtClean="0"/>
-                        <a:t>: </a:t>
+                        <a:t>UAT_5: </a:t>
                       </a:r>
                       <a:r>
                         <a:rPr lang="en-US" dirty="0" smtClean="0"/>
@@ -6916,11 +6434,7 @@
                       </a:pPr>
                       <a:r>
                         <a:rPr lang="en-US" b="1" dirty="0" smtClean="0"/>
-                        <a:t>UAT_6</a:t>
-                      </a:r>
-                      <a:r>
-                        <a:rPr lang="en-US" b="1" dirty="0" smtClean="0"/>
-                        <a:t>: </a:t>
+                        <a:t>UAT_6: </a:t>
                       </a:r>
                       <a:r>
                         <a:rPr lang="en-US" dirty="0" smtClean="0"/>
@@ -6954,11 +6468,7 @@
                       </a:pPr>
                       <a:r>
                         <a:rPr lang="en-US" b="1" dirty="0" smtClean="0"/>
-                        <a:t>UAT_7</a:t>
-                      </a:r>
-                      <a:r>
-                        <a:rPr lang="en-US" b="1" dirty="0" smtClean="0"/>
-                        <a:t>: </a:t>
+                        <a:t>UAT_7: </a:t>
                       </a:r>
                       <a:r>
                         <a:rPr lang="en-US" dirty="0" smtClean="0"/>
@@ -6994,11 +6504,7 @@
                       </a:pPr>
                       <a:r>
                         <a:rPr lang="en-US" b="1" dirty="0" smtClean="0"/>
-                        <a:t>UAT_8</a:t>
-                      </a:r>
-                      <a:r>
-                        <a:rPr lang="en-US" b="1" dirty="0" smtClean="0"/>
-                        <a:t>: </a:t>
+                        <a:t>UAT_8: </a:t>
                       </a:r>
                       <a:r>
                         <a:rPr lang="en-US" dirty="0" smtClean="0"/>
@@ -7037,11 +6543,7 @@
                       </a:pPr>
                       <a:r>
                         <a:rPr lang="en-US" b="1" dirty="0" smtClean="0"/>
-                        <a:t>UAT_9</a:t>
-                      </a:r>
-                      <a:r>
-                        <a:rPr lang="en-US" b="1" dirty="0" smtClean="0"/>
-                        <a:t>: </a:t>
+                        <a:t>UAT_9: </a:t>
                       </a:r>
                       <a:r>
                         <a:rPr lang="en-US" dirty="0" smtClean="0"/>
@@ -7080,11 +6582,7 @@
                       </a:pPr>
                       <a:r>
                         <a:rPr lang="en-US" b="1" dirty="0" smtClean="0"/>
-                        <a:t>UAT_10</a:t>
-                      </a:r>
-                      <a:r>
-                        <a:rPr lang="en-US" b="1" dirty="0" smtClean="0"/>
-                        <a:t>: </a:t>
+                        <a:t>UAT_10: </a:t>
                       </a:r>
                       <a:r>
                         <a:rPr lang="en-US" dirty="0" smtClean="0"/>
@@ -7118,11 +6616,7 @@
                       </a:pPr>
                       <a:r>
                         <a:rPr lang="en-US" b="1" dirty="0" smtClean="0"/>
-                        <a:t>UAT_11</a:t>
-                      </a:r>
-                      <a:r>
-                        <a:rPr lang="en-US" b="1" dirty="0" smtClean="0"/>
-                        <a:t>: </a:t>
+                        <a:t>UAT_11: </a:t>
                       </a:r>
                       <a:r>
                         <a:rPr lang="en-US" dirty="0" smtClean="0"/>
@@ -7156,11 +6650,7 @@
                       </a:pPr>
                       <a:r>
                         <a:rPr lang="en-US" b="1" dirty="0" smtClean="0"/>
-                        <a:t>UAT_12</a:t>
-                      </a:r>
-                      <a:r>
-                        <a:rPr lang="en-US" b="1" dirty="0" smtClean="0"/>
-                        <a:t>: </a:t>
+                        <a:t>UAT_12: </a:t>
                       </a:r>
                       <a:r>
                         <a:rPr lang="en-US" dirty="0" smtClean="0"/>
@@ -7194,11 +6684,7 @@
                       </a:pPr>
                       <a:r>
                         <a:rPr lang="en-US" b="1" dirty="0" smtClean="0"/>
-                        <a:t>UAT_13</a:t>
-                      </a:r>
-                      <a:r>
-                        <a:rPr lang="en-US" b="1" dirty="0" smtClean="0"/>
-                        <a:t>:</a:t>
+                        <a:t>UAT_13:</a:t>
                       </a:r>
                       <a:r>
                         <a:rPr lang="en-US" b="1" baseline="0" dirty="0" smtClean="0"/>
@@ -7274,7 +6760,7 @@
   <p:timing>
     <p:tnLst>
       <p:par>
-        <p:cTn xmlns:p14="http://schemas.microsoft.com/office/powerpoint/2010/main" id="1" dur="indefinite" restart="never" nodeType="tmRoot"/>
+        <p:cTn id="1" dur="indefinite" restart="never" nodeType="tmRoot"/>
       </p:par>
     </p:tnLst>
   </p:timing>
@@ -8567,7 +8053,7 @@
   <p:timing>
     <p:tnLst>
       <p:par>
-        <p:cTn xmlns:p14="http://schemas.microsoft.com/office/powerpoint/2010/main" id="1" dur="indefinite" restart="never" nodeType="tmRoot"/>
+        <p:cTn id="1" dur="indefinite" restart="never" nodeType="tmRoot"/>
       </p:par>
     </p:tnLst>
   </p:timing>
@@ -8744,7 +8230,7 @@
   <p:timing>
     <p:tnLst>
       <p:par>
-        <p:cTn xmlns:p14="http://schemas.microsoft.com/office/powerpoint/2010/main" id="1" dur="indefinite" restart="never" nodeType="tmRoot"/>
+        <p:cTn id="1" dur="indefinite" restart="never" nodeType="tmRoot"/>
       </p:par>
     </p:tnLst>
   </p:timing>
@@ -9674,7 +9160,7 @@
   <p:timing>
     <p:tnLst>
       <p:par>
-        <p:cTn xmlns:p14="http://schemas.microsoft.com/office/powerpoint/2010/main" id="1" dur="indefinite" restart="never" nodeType="tmRoot"/>
+        <p:cTn id="1" dur="indefinite" restart="never" nodeType="tmRoot"/>
       </p:par>
     </p:tnLst>
   </p:timing>
@@ -9806,7 +9292,7 @@
   <p:timing>
     <p:tnLst>
       <p:par>
-        <p:cTn xmlns:p14="http://schemas.microsoft.com/office/powerpoint/2010/main" id="1" dur="indefinite" restart="never" nodeType="tmRoot"/>
+        <p:cTn id="1" dur="indefinite" restart="never" nodeType="tmRoot"/>
       </p:par>
     </p:tnLst>
   </p:timing>
@@ -10459,7 +9945,7 @@
   <p:timing>
     <p:tnLst>
       <p:par>
-        <p:cTn xmlns:p14="http://schemas.microsoft.com/office/powerpoint/2010/main" id="1" dur="indefinite" restart="never" nodeType="tmRoot"/>
+        <p:cTn id="1" dur="indefinite" restart="never" nodeType="tmRoot"/>
       </p:par>
     </p:tnLst>
   </p:timing>
@@ -10507,7 +9993,7 @@
       </p:sp>
       <p:graphicFrame>
         <p:nvGraphicFramePr>
-          <p:cNvPr id="6" name="Content Placeholder 5"/>
+          <p:cNvPr id="4" name="Content Placeholder 3"/>
           <p:cNvGraphicFramePr>
             <a:graphicFrameLocks noGrp="1"/>
           </p:cNvGraphicFramePr>
@@ -10515,14 +10001,14 @@
             <p:ph idx="1"/>
             <p:extLst>
               <p:ext uri="{D42A27DB-BD31-4B8C-83A1-F6EECF244321}">
-                <p14:modId xmlns:p14="http://schemas.microsoft.com/office/powerpoint/2010/main" val="2794626482"/>
+                <p14:modId xmlns:p14="http://schemas.microsoft.com/office/powerpoint/2010/main" val="1336996606"/>
               </p:ext>
             </p:extLst>
           </p:nvPr>
         </p:nvGraphicFramePr>
         <p:xfrm>
-          <a:off x="685800" y="1371600"/>
-          <a:ext cx="7162799" cy="5334001"/>
+          <a:off x="990600" y="1891030"/>
+          <a:ext cx="6248400" cy="4162047"/>
         </p:xfrm>
         <a:graphic>
           <a:graphicData uri="http://schemas.openxmlformats.org/drawingml/2006/table">
@@ -10531,10 +10017,10 @@
                 <a:tableStyleId>{5C22544A-7EE6-4342-B048-85BDC9FD1C3A}</a:tableStyleId>
               </a:tblPr>
               <a:tblGrid>
-                <a:gridCol w="2013784"/>
-                <a:gridCol w="5149015"/>
+                <a:gridCol w="1756705"/>
+                <a:gridCol w="4491695"/>
               </a:tblGrid>
-              <a:tr h="444947">
+              <a:tr h="0">
                 <a:tc>
                   <a:txBody>
                     <a:bodyPr/>
@@ -10557,12 +10043,12 @@
                         </a:tabLst>
                       </a:pPr>
                       <a:r>
-                        <a:rPr lang="en-US" sz="1600">
+                        <a:rPr lang="en-US" sz="1200" dirty="0">
                           <a:effectLst/>
                         </a:rPr>
                         <a:t>ID</a:t>
                       </a:r>
-                      <a:endParaRPr lang="en-US" sz="1600">
+                      <a:endParaRPr lang="en-US" sz="1200" dirty="0">
                         <a:effectLst/>
                         <a:latin typeface="Times"/>
                         <a:ea typeface="Times"/>
@@ -10594,12 +10080,12 @@
                         </a:tabLst>
                       </a:pPr>
                       <a:r>
-                        <a:rPr lang="en-US" sz="1600">
+                        <a:rPr lang="en-US" sz="1200">
                           <a:effectLst/>
                         </a:rPr>
                         <a:t>FT_2</a:t>
                       </a:r>
-                      <a:endParaRPr lang="en-US" sz="1600">
+                      <a:endParaRPr lang="en-US" sz="1200">
                         <a:effectLst/>
                         <a:latin typeface="Times"/>
                         <a:ea typeface="Times"/>
@@ -10610,7 +10096,7 @@
                   <a:tcPr marL="63500" marR="63500" marT="63500" marB="63500"/>
                 </a:tc>
               </a:tr>
-              <a:tr h="444947">
+              <a:tr h="0">
                 <a:tc>
                   <a:txBody>
                     <a:bodyPr/>
@@ -10633,12 +10119,12 @@
                         </a:tabLst>
                       </a:pPr>
                       <a:r>
-                        <a:rPr lang="en-US" sz="1600">
+                        <a:rPr lang="en-US" sz="1200" dirty="0">
                           <a:effectLst/>
                         </a:rPr>
                         <a:t>Item to Test</a:t>
                       </a:r>
-                      <a:endParaRPr lang="en-US" sz="1600">
+                      <a:endParaRPr lang="en-US" sz="1200" dirty="0">
                         <a:effectLst/>
                         <a:latin typeface="Times"/>
                         <a:ea typeface="Times"/>
@@ -10670,12 +10156,12 @@
                         </a:tabLst>
                       </a:pPr>
                       <a:r>
-                        <a:rPr lang="en-US" sz="1600">
+                        <a:rPr lang="en-US" sz="1200">
                           <a:effectLst/>
                         </a:rPr>
                         <a:t>Register</a:t>
                       </a:r>
-                      <a:endParaRPr lang="en-US" sz="1600">
+                      <a:endParaRPr lang="en-US" sz="1200">
                         <a:effectLst/>
                         <a:latin typeface="Times"/>
                         <a:ea typeface="Times"/>
@@ -10686,7 +10172,7 @@
                   <a:tcPr marL="63500" marR="63500" marT="63500" marB="63500"/>
                 </a:tc>
               </a:tr>
-              <a:tr h="444947">
+              <a:tr h="0">
                 <a:tc>
                   <a:txBody>
                     <a:bodyPr/>
@@ -10709,12 +10195,12 @@
                         </a:tabLst>
                       </a:pPr>
                       <a:r>
-                        <a:rPr lang="en-US" sz="1600">
+                        <a:rPr lang="en-US" sz="1200">
                           <a:effectLst/>
                         </a:rPr>
                         <a:t>Pre-Conditions</a:t>
                       </a:r>
-                      <a:endParaRPr lang="en-US" sz="1600">
+                      <a:endParaRPr lang="en-US" sz="1200">
                         <a:effectLst/>
                         <a:latin typeface="Times"/>
                         <a:ea typeface="Times"/>
@@ -10738,12 +10224,12 @@
                         </a:tabLst>
                       </a:pPr>
                       <a:r>
-                        <a:rPr lang="en-US" sz="1600">
-                          <a:effectLst/>
-                        </a:rPr>
-                        <a:t>None</a:t>
-                      </a:r>
-                      <a:endParaRPr lang="en-US" sz="1600">
+                        <a:rPr lang="en-US" sz="1200" dirty="0">
+                          <a:effectLst/>
+                        </a:rPr>
+                        <a:t>Computech career site opened by entering www.computech.com/careers in address bar of browser.</a:t>
+                      </a:r>
+                      <a:endParaRPr lang="en-US" sz="1200" dirty="0">
                         <a:effectLst/>
                         <a:latin typeface="Calibri"/>
                       </a:endParaRPr>
@@ -10752,7 +10238,7 @@
                   <a:tcPr marL="63500" marR="63500" marT="63500" marB="63500"/>
                 </a:tc>
               </a:tr>
-              <a:tr h="2386898">
+              <a:tr h="0">
                 <a:tc>
                   <a:txBody>
                     <a:bodyPr/>
@@ -10775,12 +10261,12 @@
                         </a:tabLst>
                       </a:pPr>
                       <a:r>
-                        <a:rPr lang="en-US" sz="1600">
+                        <a:rPr lang="en-US" sz="1200">
                           <a:effectLst/>
                         </a:rPr>
                         <a:t>Test Steps</a:t>
                       </a:r>
-                      <a:endParaRPr lang="en-US" sz="1600">
+                      <a:endParaRPr lang="en-US" sz="1200">
                         <a:effectLst/>
                         <a:latin typeface="Times"/>
                         <a:ea typeface="Times"/>
@@ -10814,7 +10300,7 @@
                         </a:tabLst>
                       </a:pPr>
                       <a:r>
-                        <a:rPr lang="en-US" sz="1600" dirty="0">
+                        <a:rPr lang="en-US" sz="1200" dirty="0">
                           <a:effectLst/>
                         </a:rPr>
                         <a:t>Click on Users button on header.</a:t>
@@ -10840,7 +10326,7 @@
                         </a:tabLst>
                       </a:pPr>
                       <a:r>
-                        <a:rPr lang="en-US" sz="1600" dirty="0">
+                        <a:rPr lang="en-US" sz="1200" dirty="0">
                           <a:effectLst/>
                         </a:rPr>
                         <a:t>Click on Register link button.</a:t>
@@ -10866,7 +10352,7 @@
                         </a:tabLst>
                       </a:pPr>
                       <a:r>
-                        <a:rPr lang="en-US" sz="1600" dirty="0">
+                        <a:rPr lang="en-US" sz="1200" dirty="0">
                           <a:effectLst/>
                         </a:rPr>
                         <a:t>Fill in First name  - John, </a:t>
@@ -10890,7 +10376,7 @@
                         </a:tabLst>
                       </a:pPr>
                       <a:r>
-                        <a:rPr lang="en-US" sz="1600" dirty="0">
+                        <a:rPr lang="en-US" sz="1200" dirty="0">
                           <a:effectLst/>
                         </a:rPr>
                         <a:t>Last name - Doe, </a:t>
@@ -10914,7 +10400,7 @@
                         </a:tabLst>
                       </a:pPr>
                       <a:r>
-                        <a:rPr lang="en-US" sz="1600" dirty="0">
+                        <a:rPr lang="en-US" sz="1200" dirty="0">
                           <a:effectLst/>
                         </a:rPr>
                         <a:t>Email ID – john.doe@email.com, </a:t>
@@ -10938,7 +10424,7 @@
                         </a:tabLst>
                       </a:pPr>
                       <a:r>
-                        <a:rPr lang="en-US" sz="1600" dirty="0">
+                        <a:rPr lang="en-US" sz="1200" dirty="0">
                           <a:effectLst/>
                         </a:rPr>
                         <a:t>Password - 123456, </a:t>
@@ -10962,14 +10448,14 @@
                         </a:tabLst>
                       </a:pPr>
                       <a:r>
-                        <a:rPr lang="en-US" sz="1600" dirty="0">
+                        <a:rPr lang="en-US" sz="1200" dirty="0">
                           <a:effectLst/>
                         </a:rPr>
                         <a:t>Confirm Password - 123456.</a:t>
                       </a:r>
                     </a:p>
                     <a:p>
-                      <a:pPr marL="339725" marR="0" lvl="0" indent="-339725">
+                      <a:pPr marL="342900" marR="0" lvl="0" indent="-342900">
                         <a:lnSpc>
                           <a:spcPct val="115000"/>
                         </a:lnSpc>
@@ -10980,7 +10466,7 @@
                           <a:spcPts val="0"/>
                         </a:spcAft>
                         <a:buFont typeface="+mj-lt"/>
-                        <a:buNone/>
+                        <a:buAutoNum type="arabicPeriod"/>
                         <a:tabLst>
                           <a:tab pos="114300" algn="l"/>
                           <a:tab pos="228600" algn="l"/>
@@ -10988,18 +10474,12 @@
                         </a:tabLst>
                       </a:pPr>
                       <a:r>
-                        <a:rPr lang="en-US" sz="1600" dirty="0" smtClean="0">
-                          <a:effectLst/>
-                        </a:rPr>
-                        <a:t>4.       Click </a:t>
-                      </a:r>
-                      <a:r>
-                        <a:rPr lang="en-US" sz="1600" dirty="0">
-                          <a:effectLst/>
-                        </a:rPr>
-                        <a:t>on Register.</a:t>
-                      </a:r>
-                      <a:endParaRPr lang="en-US" sz="1600" dirty="0">
+                        <a:rPr lang="en-US" sz="1200" dirty="0">
+                          <a:effectLst/>
+                        </a:rPr>
+                        <a:t>Click on Register.</a:t>
+                      </a:r>
+                      <a:endParaRPr lang="en-US" sz="1200" dirty="0">
                         <a:effectLst/>
                         <a:latin typeface="Times"/>
                         <a:ea typeface="Times"/>
@@ -11010,7 +10490,7 @@
                   <a:tcPr marL="63500" marR="63500" marT="63500" marB="63500"/>
                 </a:tc>
               </a:tr>
-              <a:tr h="722368">
+              <a:tr h="0">
                 <a:tc>
                   <a:txBody>
                     <a:bodyPr/>
@@ -11033,12 +10513,12 @@
                         </a:tabLst>
                       </a:pPr>
                       <a:r>
-                        <a:rPr lang="en-US" sz="1600">
+                        <a:rPr lang="en-US" sz="1200">
                           <a:effectLst/>
                         </a:rPr>
                         <a:t>Expected Results</a:t>
                       </a:r>
-                      <a:endParaRPr lang="en-US" sz="1600">
+                      <a:endParaRPr lang="en-US" sz="1200">
                         <a:effectLst/>
                         <a:latin typeface="Times"/>
                         <a:ea typeface="Times"/>
@@ -11070,12 +10550,12 @@
                         </a:tabLst>
                       </a:pPr>
                       <a:r>
-                        <a:rPr lang="en-US" sz="1600">
-                          <a:effectLst/>
-                        </a:rPr>
-                        <a:t>System displays confirmation page with a message about verification email sent to user provided email address.</a:t>
-                      </a:r>
-                      <a:endParaRPr lang="en-US" sz="1600">
+                        <a:rPr lang="en-US" sz="1200">
+                          <a:effectLst/>
+                        </a:rPr>
+                        <a:t>Web application displays confirmation page with a message about verification email sent to user provided email address.</a:t>
+                      </a:r>
+                      <a:endParaRPr lang="en-US" sz="1200">
                         <a:effectLst/>
                         <a:latin typeface="Times"/>
                         <a:ea typeface="Times"/>
@@ -11086,7 +10566,7 @@
                   <a:tcPr marL="63500" marR="63500" marT="63500" marB="63500"/>
                 </a:tc>
               </a:tr>
-              <a:tr h="444947">
+              <a:tr h="0">
                 <a:tc>
                   <a:txBody>
                     <a:bodyPr/>
@@ -11109,12 +10589,12 @@
                         </a:tabLst>
                       </a:pPr>
                       <a:r>
-                        <a:rPr lang="en-US" sz="1600">
+                        <a:rPr lang="en-US" sz="1200">
                           <a:effectLst/>
                         </a:rPr>
                         <a:t>Priority</a:t>
                       </a:r>
-                      <a:endParaRPr lang="en-US" sz="1600">
+                      <a:endParaRPr lang="en-US" sz="1200">
                         <a:effectLst/>
                         <a:latin typeface="Times"/>
                         <a:ea typeface="Times"/>
@@ -11146,12 +10626,12 @@
                         </a:tabLst>
                       </a:pPr>
                       <a:r>
-                        <a:rPr lang="en-US" sz="1600">
+                        <a:rPr lang="en-US" sz="1200">
                           <a:effectLst/>
                         </a:rPr>
                         <a:t>High</a:t>
                       </a:r>
-                      <a:endParaRPr lang="en-US" sz="1600">
+                      <a:endParaRPr lang="en-US" sz="1200">
                         <a:effectLst/>
                         <a:latin typeface="Times"/>
                         <a:ea typeface="Times"/>
@@ -11162,7 +10642,7 @@
                   <a:tcPr marL="63500" marR="63500" marT="63500" marB="63500"/>
                 </a:tc>
               </a:tr>
-              <a:tr h="444947">
+              <a:tr h="0">
                 <a:tc>
                   <a:txBody>
                     <a:bodyPr/>
@@ -11185,12 +10665,12 @@
                         </a:tabLst>
                       </a:pPr>
                       <a:r>
-                        <a:rPr lang="en-US" sz="1600">
+                        <a:rPr lang="en-US" sz="1200" dirty="0">
                           <a:effectLst/>
                         </a:rPr>
                         <a:t>Pass/Fail</a:t>
                       </a:r>
-                      <a:endParaRPr lang="en-US" sz="1600">
+                      <a:endParaRPr lang="en-US" sz="1200" dirty="0">
                         <a:effectLst/>
                         <a:latin typeface="Times"/>
                         <a:ea typeface="Times"/>
@@ -11222,12 +10702,12 @@
                         </a:tabLst>
                       </a:pPr>
                       <a:r>
-                        <a:rPr lang="en-US" sz="1600" dirty="0">
-                          <a:effectLst/>
-                        </a:rPr>
-                        <a:t> Pass if system redirects user to Register page.</a:t>
-                      </a:r>
-                      <a:endParaRPr lang="en-US" sz="1600" dirty="0">
+                        <a:rPr lang="en-US" sz="1200" dirty="0">
+                          <a:effectLst/>
+                        </a:rPr>
+                        <a:t>Pass if web application redirects user to Register page.</a:t>
+                      </a:r>
+                      <a:endParaRPr lang="en-US" sz="1200" dirty="0">
                         <a:effectLst/>
                         <a:latin typeface="Times"/>
                         <a:ea typeface="Times"/>
@@ -11255,7 +10735,7 @@
   <p:timing>
     <p:tnLst>
       <p:par>
-        <p:cTn xmlns:p14="http://schemas.microsoft.com/office/powerpoint/2010/main" id="1" dur="indefinite" restart="never" nodeType="tmRoot"/>
+        <p:cTn id="1" dur="indefinite" restart="never" nodeType="tmRoot"/>
       </p:par>
     </p:tnLst>
   </p:timing>
@@ -11480,7 +10960,7 @@
   <p:timing>
     <p:tnLst>
       <p:par>
-        <p:cTn xmlns:p14="http://schemas.microsoft.com/office/powerpoint/2010/main" id="1" dur="indefinite" restart="never" nodeType="tmRoot"/>
+        <p:cTn id="1" dur="indefinite" restart="never" nodeType="tmRoot"/>
       </p:par>
     </p:tnLst>
   </p:timing>
@@ -12178,7 +11658,7 @@
   <p:timing>
     <p:tnLst>
       <p:par>
-        <p:cTn xmlns:p14="http://schemas.microsoft.com/office/powerpoint/2010/main" id="1" dur="indefinite" restart="never" nodeType="tmRoot"/>
+        <p:cTn id="1" dur="indefinite" restart="never" nodeType="tmRoot"/>
       </p:par>
     </p:tnLst>
   </p:timing>
@@ -12252,21 +11732,21 @@
       </p:sp>
       <p:graphicFrame>
         <p:nvGraphicFramePr>
-          <p:cNvPr id="4" name="Table 3"/>
+          <p:cNvPr id="5" name="Table 4"/>
           <p:cNvGraphicFramePr>
             <a:graphicFrameLocks noGrp="1"/>
           </p:cNvGraphicFramePr>
           <p:nvPr>
             <p:extLst>
               <p:ext uri="{D42A27DB-BD31-4B8C-83A1-F6EECF244321}">
-                <p14:modId xmlns:p14="http://schemas.microsoft.com/office/powerpoint/2010/main" val="53270586"/>
+                <p14:modId xmlns:p14="http://schemas.microsoft.com/office/powerpoint/2010/main" val="1965344982"/>
               </p:ext>
             </p:extLst>
           </p:nvPr>
         </p:nvGraphicFramePr>
         <p:xfrm>
-          <a:off x="609600" y="2590800"/>
-          <a:ext cx="7543800" cy="3735534"/>
+          <a:off x="762000" y="2590800"/>
+          <a:ext cx="6781800" cy="3570224"/>
         </p:xfrm>
         <a:graphic>
           <a:graphicData uri="http://schemas.openxmlformats.org/drawingml/2006/table">
@@ -12275,11 +11755,11 @@
                 <a:tableStyleId>{5C22544A-7EE6-4342-B048-85BDC9FD1C3A}</a:tableStyleId>
               </a:tblPr>
               <a:tblGrid>
-                <a:gridCol w="2514600"/>
-                <a:gridCol w="2514600"/>
-                <a:gridCol w="2514600"/>
+                <a:gridCol w="2260600"/>
+                <a:gridCol w="2260600"/>
+                <a:gridCol w="2260600"/>
               </a:tblGrid>
-              <a:tr h="479002">
+              <a:tr h="378976">
                 <a:tc>
                   <a:txBody>
                     <a:bodyPr/>
@@ -12302,12 +11782,12 @@
                         </a:tabLst>
                       </a:pPr>
                       <a:r>
-                        <a:rPr lang="en-US" sz="1800">
+                        <a:rPr lang="en-US" sz="1200" dirty="0">
                           <a:effectLst/>
                         </a:rPr>
                         <a:t>Device</a:t>
                       </a:r>
-                      <a:endParaRPr lang="en-US" sz="1800">
+                      <a:endParaRPr lang="en-US" sz="1200" dirty="0">
                         <a:effectLst/>
                         <a:latin typeface="Times"/>
                         <a:ea typeface="Times"/>
@@ -12339,12 +11819,12 @@
                         </a:tabLst>
                       </a:pPr>
                       <a:r>
-                        <a:rPr lang="en-US" sz="1800">
+                        <a:rPr lang="en-US" sz="1200">
                           <a:effectLst/>
                         </a:rPr>
                         <a:t>Operating System</a:t>
                       </a:r>
-                      <a:endParaRPr lang="en-US" sz="1800">
+                      <a:endParaRPr lang="en-US" sz="1200">
                         <a:effectLst/>
                         <a:latin typeface="Times"/>
                         <a:ea typeface="Times"/>
@@ -12376,12 +11856,12 @@
                         </a:tabLst>
                       </a:pPr>
                       <a:r>
-                        <a:rPr lang="en-US" sz="1800">
+                        <a:rPr lang="en-US" sz="1200">
                           <a:effectLst/>
                         </a:rPr>
                         <a:t>Browsers</a:t>
                       </a:r>
-                      <a:endParaRPr lang="en-US" sz="1800">
+                      <a:endParaRPr lang="en-US" sz="1200">
                         <a:effectLst/>
                         <a:latin typeface="Times"/>
                         <a:ea typeface="Times"/>
@@ -12392,7 +11872,7 @@
                   <a:tcPr marL="63500" marR="63500" marT="63500" marB="63500"/>
                 </a:tc>
               </a:tr>
-              <a:tr h="1310939">
+              <a:tr h="1713594">
                 <a:tc>
                   <a:txBody>
                     <a:bodyPr/>
@@ -12415,12 +11895,12 @@
                         </a:tabLst>
                       </a:pPr>
                       <a:r>
-                        <a:rPr lang="en-US" sz="1800">
+                        <a:rPr lang="en-US" sz="1200">
                           <a:effectLst/>
                         </a:rPr>
                         <a:t>Laptop / Desktop</a:t>
                       </a:r>
-                      <a:endParaRPr lang="en-US" sz="1800">
+                      <a:endParaRPr lang="en-US" sz="1200">
                         <a:effectLst/>
                         <a:latin typeface="Times"/>
                         <a:ea typeface="Times"/>
@@ -12446,7 +11926,7 @@
                         </a:tabLst>
                       </a:pPr>
                       <a:r>
-                        <a:rPr lang="en-US" sz="1800" u="none" strike="noStrike">
+                        <a:rPr lang="en-US" sz="1100" u="none" strike="noStrike">
                           <a:effectLst/>
                         </a:rPr>
                         <a:t>Windows (any)</a:t>
@@ -12464,12 +11944,12 @@
                         </a:tabLst>
                       </a:pPr>
                       <a:r>
-                        <a:rPr lang="en-US" sz="1800" u="none" strike="noStrike">
+                        <a:rPr lang="en-US" sz="1100" u="none" strike="noStrike">
                           <a:effectLst/>
                         </a:rPr>
                         <a:t>OS X</a:t>
                       </a:r>
-                      <a:endParaRPr lang="en-US" sz="1800" u="none" strike="noStrike">
+                      <a:endParaRPr lang="en-US" sz="1100" u="none" strike="noStrike">
                         <a:effectLst/>
                         <a:latin typeface="Calibri"/>
                       </a:endParaRPr>
@@ -12493,10 +11973,10 @@
                         </a:tabLst>
                       </a:pPr>
                       <a:r>
-                        <a:rPr lang="en-US" sz="1800" u="none" strike="noStrike">
-                          <a:effectLst/>
-                        </a:rPr>
-                        <a:t>Google Chrome</a:t>
+                        <a:rPr lang="en-US" sz="1100" u="none" strike="noStrike" dirty="0">
+                          <a:effectLst/>
+                        </a:rPr>
+                        <a:t>Google Chrome (v. 40 and above)</a:t>
                       </a:r>
                     </a:p>
                     <a:p>
@@ -12511,10 +11991,10 @@
                         </a:tabLst>
                       </a:pPr>
                       <a:r>
-                        <a:rPr lang="en-US" sz="1800" u="none" strike="noStrike">
-                          <a:effectLst/>
-                        </a:rPr>
-                        <a:t>Mozilla Firefox</a:t>
+                        <a:rPr lang="en-US" sz="1100" u="none" strike="noStrike" dirty="0">
+                          <a:effectLst/>
+                        </a:rPr>
+                        <a:t>Mozilla Firefox  (v. 30 and above)</a:t>
                       </a:r>
                     </a:p>
                     <a:p>
@@ -12529,10 +12009,22 @@
                         </a:tabLst>
                       </a:pPr>
                       <a:r>
-                        <a:rPr lang="en-US" sz="1800" u="none" strike="noStrike">
-                          <a:effectLst/>
-                        </a:rPr>
-                        <a:t>Safari</a:t>
+                        <a:rPr lang="en-US" sz="1100" u="none" strike="noStrike" dirty="0">
+                          <a:effectLst/>
+                        </a:rPr>
+                        <a:t>Safari </a:t>
+                      </a:r>
+                      <a:r>
+                        <a:rPr lang="en-US" sz="1100" u="none" strike="noStrike" dirty="0" smtClean="0">
+                          <a:effectLst/>
+                        </a:rPr>
+                        <a:t>(v. </a:t>
+                      </a:r>
+                      <a:r>
+                        <a:rPr lang="en-US" sz="1100" u="none" strike="noStrike" dirty="0">
+                          <a:effectLst/>
+                        </a:rPr>
+                        <a:t>6.2.3 and above) </a:t>
                       </a:r>
                     </a:p>
                     <a:p>
@@ -12547,12 +12039,12 @@
                         </a:tabLst>
                       </a:pPr>
                       <a:r>
-                        <a:rPr lang="en-US" sz="1800" u="none" strike="noStrike">
-                          <a:effectLst/>
-                        </a:rPr>
-                        <a:t>Internet Explorer &gt; 9</a:t>
-                      </a:r>
-                      <a:endParaRPr lang="en-US" sz="1800" u="none" strike="noStrike">
+                        <a:rPr lang="en-US" sz="1100" u="none" strike="noStrike" dirty="0">
+                          <a:effectLst/>
+                        </a:rPr>
+                        <a:t>Internet Explorer (9 and above)</a:t>
+                      </a:r>
+                      <a:endParaRPr lang="en-US" sz="1100" u="none" strike="noStrike" dirty="0">
                         <a:effectLst/>
                         <a:latin typeface="Calibri"/>
                       </a:endParaRPr>
@@ -12561,7 +12053,7 @@
                   <a:tcPr marL="63500" marR="63500" marT="63500" marB="63500" anchor="ctr"/>
                 </a:tc>
               </a:tr>
-              <a:tr h="766889">
+              <a:tr h="606746">
                 <a:tc>
                   <a:txBody>
                     <a:bodyPr/>
@@ -12584,7 +12076,7 @@
                         </a:tabLst>
                       </a:pPr>
                       <a:r>
-                        <a:rPr lang="en-US" sz="1800">
+                        <a:rPr lang="en-US" sz="1200">
                           <a:effectLst/>
                         </a:rPr>
                         <a:t>Tablets</a:t>
@@ -12602,12 +12094,12 @@
                         </a:tabLst>
                       </a:pPr>
                       <a:r>
-                        <a:rPr lang="en-US" sz="1800" u="none" strike="noStrike">
+                        <a:rPr lang="en-US" sz="1100" u="none" strike="noStrike">
                           <a:effectLst/>
                         </a:rPr>
                         <a:t>iPad Air</a:t>
                       </a:r>
-                      <a:endParaRPr lang="en-US" sz="1800" u="none" strike="noStrike">
+                      <a:endParaRPr lang="en-US" sz="1100" u="none" strike="noStrike">
                         <a:effectLst/>
                         <a:latin typeface="Calibri"/>
                       </a:endParaRPr>
@@ -12631,12 +12123,12 @@
                         </a:tabLst>
                       </a:pPr>
                       <a:r>
-                        <a:rPr lang="en-US" sz="1800" u="none" strike="noStrike">
+                        <a:rPr lang="en-US" sz="1100" u="none" strike="noStrike">
                           <a:effectLst/>
                         </a:rPr>
                         <a:t>iOS 8.1.3</a:t>
                       </a:r>
-                      <a:endParaRPr lang="en-US" sz="1800" u="none" strike="noStrike">
+                      <a:endParaRPr lang="en-US" sz="1100" u="none" strike="noStrike">
                         <a:effectLst/>
                         <a:latin typeface="Calibri"/>
                       </a:endParaRPr>
@@ -12660,12 +12152,12 @@
                         </a:tabLst>
                       </a:pPr>
                       <a:r>
-                        <a:rPr lang="en-US" sz="1800" u="none" strike="noStrike">
+                        <a:rPr lang="en-US" sz="1100" u="none" strike="noStrike">
                           <a:effectLst/>
                         </a:rPr>
                         <a:t>Safari</a:t>
                       </a:r>
-                      <a:endParaRPr lang="en-US" sz="1800" u="none" strike="noStrike">
+                      <a:endParaRPr lang="en-US" sz="1100" u="none" strike="noStrike">
                         <a:effectLst/>
                         <a:latin typeface="Calibri"/>
                       </a:endParaRPr>
@@ -12674,7 +12166,7 @@
                   <a:tcPr marL="63500" marR="63500" marT="63500" marB="63500" anchor="ctr"/>
                 </a:tc>
               </a:tr>
-              <a:tr h="1100771">
+              <a:tr h="870908">
                 <a:tc>
                   <a:txBody>
                     <a:bodyPr/>
@@ -12697,7 +12189,7 @@
                         </a:tabLst>
                       </a:pPr>
                       <a:r>
-                        <a:rPr lang="en-US" sz="1800">
+                        <a:rPr lang="en-US" sz="1200">
                           <a:effectLst/>
                         </a:rPr>
                         <a:t>Phone</a:t>
@@ -12723,7 +12215,7 @@
                         </a:tabLst>
                       </a:pPr>
                       <a:r>
-                        <a:rPr lang="en-US" sz="1800">
+                        <a:rPr lang="en-US" sz="1200">
                           <a:effectLst/>
                         </a:rPr>
                         <a:t>iPhone 6 </a:t>
@@ -12749,12 +12241,12 @@
                         </a:tabLst>
                       </a:pPr>
                       <a:r>
-                        <a:rPr lang="en-US" sz="1800">
+                        <a:rPr lang="en-US" sz="1200">
                           <a:effectLst/>
                         </a:rPr>
                         <a:t>Samsung Galaxy S5</a:t>
                       </a:r>
-                      <a:endParaRPr lang="en-US" sz="1800">
+                      <a:endParaRPr lang="en-US" sz="1200">
                         <a:effectLst/>
                         <a:latin typeface="Times"/>
                         <a:ea typeface="Times"/>
@@ -12780,7 +12272,7 @@
                         </a:tabLst>
                       </a:pPr>
                       <a:r>
-                        <a:rPr lang="en-US" sz="1800" u="none" strike="noStrike">
+                        <a:rPr lang="en-US" sz="1100" u="none" strike="noStrike">
                           <a:effectLst/>
                         </a:rPr>
                         <a:t>iOS 8.1.3</a:t>
@@ -12798,12 +12290,12 @@
                         </a:tabLst>
                       </a:pPr>
                       <a:r>
-                        <a:rPr lang="en-US" sz="1800" u="none" strike="noStrike">
+                        <a:rPr lang="en-US" sz="1100" u="none" strike="noStrike">
                           <a:effectLst/>
                         </a:rPr>
                         <a:t>Android v5.0 (Lollipop)</a:t>
                       </a:r>
-                      <a:endParaRPr lang="en-US" sz="1800" u="none" strike="noStrike">
+                      <a:endParaRPr lang="en-US" sz="1100" u="none" strike="noStrike">
                         <a:effectLst/>
                         <a:latin typeface="Calibri"/>
                       </a:endParaRPr>
@@ -12827,7 +12319,7 @@
                         </a:tabLst>
                       </a:pPr>
                       <a:r>
-                        <a:rPr lang="en-US" sz="1800" u="none" strike="noStrike">
+                        <a:rPr lang="en-US" sz="1100" u="none" strike="noStrike" dirty="0">
                           <a:effectLst/>
                         </a:rPr>
                         <a:t>Safari</a:t>
@@ -12845,12 +12337,12 @@
                         </a:tabLst>
                       </a:pPr>
                       <a:r>
-                        <a:rPr lang="en-US" sz="1800" u="none" strike="noStrike">
+                        <a:rPr lang="en-US" sz="1100" u="none" strike="noStrike" dirty="0">
                           <a:effectLst/>
                         </a:rPr>
                         <a:t>Google Chrome</a:t>
                       </a:r>
-                      <a:endParaRPr lang="en-US" sz="1800" u="none" strike="noStrike">
+                      <a:endParaRPr lang="en-US" sz="1100" u="none" strike="noStrike" dirty="0">
                         <a:effectLst/>
                         <a:latin typeface="Calibri"/>
                       </a:endParaRPr>
@@ -12876,7 +12368,7 @@
   <p:timing>
     <p:tnLst>
       <p:par>
-        <p:cTn xmlns:p14="http://schemas.microsoft.com/office/powerpoint/2010/main" id="1" dur="indefinite" restart="never" nodeType="tmRoot"/>
+        <p:cTn id="1" dur="indefinite" restart="never" nodeType="tmRoot"/>
       </p:par>
     </p:tnLst>
   </p:timing>
@@ -13037,7 +12529,7 @@
   <p:timing>
     <p:tnLst>
       <p:par>
-        <p:cTn xmlns:p14="http://schemas.microsoft.com/office/powerpoint/2010/main" id="1" dur="indefinite" restart="never" nodeType="tmRoot"/>
+        <p:cTn id="1" dur="indefinite" restart="never" nodeType="tmRoot"/>
       </p:par>
     </p:tnLst>
   </p:timing>

</xml_diff>